<commit_message>
Mudanças apresentação de slides
</commit_message>
<xml_diff>
--- a/MODELO DE APOIO AO ENSINO EM AMBIENTES VIRTUAIS - APRESENTAÇÃO.pptx
+++ b/MODELO DE APOIO AO ENSINO EM AMBIENTES VIRTUAIS - APRESENTAÇÃO.pptx
@@ -212,7 +212,8 @@
           <a:p>
             <a:fld id="{734E9284-0281-4292-AD88-67EBFC2B5BE1}" type="datetimeFigureOut">
               <a:rPr lang="pt-BR" smtClean="0"/>
-              <a:t>11/12/2018</a:t>
+              <a:pPr/>
+              <a:t>12/12/2018</a:t>
             </a:fld>
             <a:endParaRPr lang="pt-BR"/>
           </a:p>
@@ -373,6 +374,7 @@
           <a:p>
             <a:fld id="{CAA2C902-F054-4E2E-B08A-955DB17D3FA1}" type="slidenum">
               <a:rPr lang="pt-BR" smtClean="0"/>
+              <a:pPr/>
               <a:t>‹nº›</a:t>
             </a:fld>
             <a:endParaRPr lang="pt-BR"/>
@@ -620,6 +622,7 @@
           <a:p>
             <a:fld id="{CAA2C902-F054-4E2E-B08A-955DB17D3FA1}" type="slidenum">
               <a:rPr lang="pt-BR" smtClean="0"/>
+              <a:pPr/>
               <a:t>3</a:t>
             </a:fld>
             <a:endParaRPr lang="pt-BR"/>
@@ -711,6 +714,7 @@
           <a:p>
             <a:fld id="{CAA2C902-F054-4E2E-B08A-955DB17D3FA1}" type="slidenum">
               <a:rPr lang="pt-BR" smtClean="0"/>
+              <a:pPr/>
               <a:t>14</a:t>
             </a:fld>
             <a:endParaRPr lang="pt-BR"/>
@@ -802,6 +806,7 @@
           <a:p>
             <a:fld id="{CAA2C902-F054-4E2E-B08A-955DB17D3FA1}" type="slidenum">
               <a:rPr lang="pt-BR" smtClean="0"/>
+              <a:pPr/>
               <a:t>15</a:t>
             </a:fld>
             <a:endParaRPr lang="pt-BR"/>
@@ -921,6 +926,7 @@
           <a:p>
             <a:fld id="{CAA2C902-F054-4E2E-B08A-955DB17D3FA1}" type="slidenum">
               <a:rPr lang="pt-BR" smtClean="0"/>
+              <a:pPr/>
               <a:t>16</a:t>
             </a:fld>
             <a:endParaRPr lang="pt-BR"/>
@@ -1002,6 +1008,7 @@
           <a:p>
             <a:fld id="{CAA2C902-F054-4E2E-B08A-955DB17D3FA1}" type="slidenum">
               <a:rPr lang="pt-BR" smtClean="0"/>
+              <a:pPr/>
               <a:t>17</a:t>
             </a:fld>
             <a:endParaRPr lang="pt-BR"/>
@@ -1097,6 +1104,7 @@
           <a:p>
             <a:fld id="{CAA2C902-F054-4E2E-B08A-955DB17D3FA1}" type="slidenum">
               <a:rPr lang="pt-BR" smtClean="0"/>
+              <a:pPr/>
               <a:t>18</a:t>
             </a:fld>
             <a:endParaRPr lang="pt-BR"/>
@@ -1192,6 +1200,7 @@
           <a:p>
             <a:fld id="{CAA2C902-F054-4E2E-B08A-955DB17D3FA1}" type="slidenum">
               <a:rPr lang="pt-BR" smtClean="0"/>
+              <a:pPr/>
               <a:t>19</a:t>
             </a:fld>
             <a:endParaRPr lang="pt-BR"/>
@@ -1285,6 +1294,7 @@
           <a:p>
             <a:fld id="{CAA2C902-F054-4E2E-B08A-955DB17D3FA1}" type="slidenum">
               <a:rPr lang="pt-BR" smtClean="0"/>
+              <a:pPr/>
               <a:t>20</a:t>
             </a:fld>
             <a:endParaRPr lang="pt-BR"/>
@@ -1378,6 +1388,7 @@
           <a:p>
             <a:fld id="{CAA2C902-F054-4E2E-B08A-955DB17D3FA1}" type="slidenum">
               <a:rPr lang="pt-BR" smtClean="0"/>
+              <a:pPr/>
               <a:t>21</a:t>
             </a:fld>
             <a:endParaRPr lang="pt-BR"/>
@@ -1469,6 +1480,7 @@
           <a:p>
             <a:fld id="{CAA2C902-F054-4E2E-B08A-955DB17D3FA1}" type="slidenum">
               <a:rPr lang="pt-BR" smtClean="0"/>
+              <a:pPr/>
               <a:t>6</a:t>
             </a:fld>
             <a:endParaRPr lang="pt-BR"/>
@@ -1560,6 +1572,7 @@
           <a:p>
             <a:fld id="{CAA2C902-F054-4E2E-B08A-955DB17D3FA1}" type="slidenum">
               <a:rPr lang="pt-BR" smtClean="0"/>
+              <a:pPr/>
               <a:t>7</a:t>
             </a:fld>
             <a:endParaRPr lang="pt-BR"/>
@@ -1651,6 +1664,7 @@
           <a:p>
             <a:fld id="{CAA2C902-F054-4E2E-B08A-955DB17D3FA1}" type="slidenum">
               <a:rPr lang="pt-BR" smtClean="0"/>
+              <a:pPr/>
               <a:t>8</a:t>
             </a:fld>
             <a:endParaRPr lang="pt-BR"/>
@@ -1742,6 +1756,7 @@
           <a:p>
             <a:fld id="{CAA2C902-F054-4E2E-B08A-955DB17D3FA1}" type="slidenum">
               <a:rPr lang="pt-BR" smtClean="0"/>
+              <a:pPr/>
               <a:t>9</a:t>
             </a:fld>
             <a:endParaRPr lang="pt-BR"/>
@@ -1833,6 +1848,7 @@
           <a:p>
             <a:fld id="{CAA2C902-F054-4E2E-B08A-955DB17D3FA1}" type="slidenum">
               <a:rPr lang="pt-BR" smtClean="0"/>
+              <a:pPr/>
               <a:t>10</a:t>
             </a:fld>
             <a:endParaRPr lang="pt-BR"/>
@@ -1914,6 +1930,7 @@
           <a:p>
             <a:fld id="{CAA2C902-F054-4E2E-B08A-955DB17D3FA1}" type="slidenum">
               <a:rPr lang="pt-BR" smtClean="0"/>
+              <a:pPr/>
               <a:t>11</a:t>
             </a:fld>
             <a:endParaRPr lang="pt-BR"/>
@@ -1974,6 +1991,18 @@
           </a:bodyPr>
           <a:lstStyle/>
           <a:p>
+            <a:r>
+              <a:rPr lang="pt-BR" dirty="0" smtClean="0"/>
+              <a:t>Modulo de processamento</a:t>
+            </a:r>
+            <a:r>
+              <a:rPr lang="pt-BR" baseline="0" dirty="0" smtClean="0"/>
+              <a:t> </a:t>
+            </a:r>
+            <a:r>
+              <a:rPr lang="pt-BR" baseline="0" dirty="0" err="1" smtClean="0"/>
+              <a:t>stuacunal</a:t>
+            </a:r>
             <a:endParaRPr lang="pt-BR" dirty="0"/>
           </a:p>
         </p:txBody>
@@ -1995,6 +2024,7 @@
           <a:p>
             <a:fld id="{CAA2C902-F054-4E2E-B08A-955DB17D3FA1}" type="slidenum">
               <a:rPr lang="pt-BR" smtClean="0"/>
+              <a:pPr/>
               <a:t>12</a:t>
             </a:fld>
             <a:endParaRPr lang="pt-BR"/>
@@ -2076,6 +2106,7 @@
           <a:p>
             <a:fld id="{CAA2C902-F054-4E2E-B08A-955DB17D3FA1}" type="slidenum">
               <a:rPr lang="pt-BR" smtClean="0"/>
+              <a:pPr/>
               <a:t>13</a:t>
             </a:fld>
             <a:endParaRPr lang="pt-BR"/>
@@ -2715,7 +2746,8 @@
           <a:p>
             <a:fld id="{236FA205-9359-4F40-A249-486FCDD57C7E}" type="datetimeFigureOut">
               <a:rPr lang="pt-BR" smtClean="0"/>
-              <a:t>11/12/2018</a:t>
+              <a:pPr/>
+              <a:t>12/12/2018</a:t>
             </a:fld>
             <a:endParaRPr lang="pt-BR"/>
           </a:p>
@@ -2777,6 +2809,7 @@
           <a:p>
             <a:fld id="{2765157F-0FE6-411A-8A48-E9EA9C39E43A}" type="slidenum">
               <a:rPr lang="pt-BR" smtClean="0"/>
+              <a:pPr/>
               <a:t>‹nº›</a:t>
             </a:fld>
             <a:endParaRPr lang="pt-BR"/>
@@ -2911,7 +2944,8 @@
           <a:p>
             <a:fld id="{236FA205-9359-4F40-A249-486FCDD57C7E}" type="datetimeFigureOut">
               <a:rPr lang="pt-BR" smtClean="0"/>
-              <a:t>11/12/2018</a:t>
+              <a:pPr/>
+              <a:t>12/12/2018</a:t>
             </a:fld>
             <a:endParaRPr lang="pt-BR"/>
           </a:p>
@@ -2957,6 +2991,7 @@
           <a:p>
             <a:fld id="{2765157F-0FE6-411A-8A48-E9EA9C39E43A}" type="slidenum">
               <a:rPr lang="pt-BR" smtClean="0"/>
+              <a:pPr/>
               <a:t>‹nº›</a:t>
             </a:fld>
             <a:endParaRPr lang="pt-BR"/>
@@ -3096,7 +3131,8 @@
           <a:p>
             <a:fld id="{236FA205-9359-4F40-A249-486FCDD57C7E}" type="datetimeFigureOut">
               <a:rPr lang="pt-BR" smtClean="0"/>
-              <a:t>11/12/2018</a:t>
+              <a:pPr/>
+              <a:t>12/12/2018</a:t>
             </a:fld>
             <a:endParaRPr lang="pt-BR"/>
           </a:p>
@@ -3142,6 +3178,7 @@
           <a:p>
             <a:fld id="{2765157F-0FE6-411A-8A48-E9EA9C39E43A}" type="slidenum">
               <a:rPr lang="pt-BR" smtClean="0"/>
+              <a:pPr/>
               <a:t>‹nº›</a:t>
             </a:fld>
             <a:endParaRPr lang="pt-BR"/>
@@ -3246,7 +3283,8 @@
           <a:p>
             <a:fld id="{236FA205-9359-4F40-A249-486FCDD57C7E}" type="datetimeFigureOut">
               <a:rPr lang="pt-BR" smtClean="0"/>
-              <a:t>11/12/2018</a:t>
+              <a:pPr/>
+              <a:t>12/12/2018</a:t>
             </a:fld>
             <a:endParaRPr lang="pt-BR"/>
           </a:p>
@@ -3292,6 +3330,7 @@
           <a:p>
             <a:fld id="{2765157F-0FE6-411A-8A48-E9EA9C39E43A}" type="slidenum">
               <a:rPr lang="pt-BR" smtClean="0"/>
+              <a:pPr/>
               <a:t>‹nº›</a:t>
             </a:fld>
             <a:endParaRPr lang="pt-BR"/>
@@ -3501,7 +3540,8 @@
           <a:p>
             <a:fld id="{236FA205-9359-4F40-A249-486FCDD57C7E}" type="datetimeFigureOut">
               <a:rPr lang="pt-BR" smtClean="0"/>
-              <a:t>11/12/2018</a:t>
+              <a:pPr/>
+              <a:t>12/12/2018</a:t>
             </a:fld>
             <a:endParaRPr lang="pt-BR"/>
           </a:p>
@@ -3547,6 +3587,7 @@
           <a:p>
             <a:fld id="{2765157F-0FE6-411A-8A48-E9EA9C39E43A}" type="slidenum">
               <a:rPr lang="pt-BR" smtClean="0"/>
+              <a:pPr/>
               <a:t>‹nº›</a:t>
             </a:fld>
             <a:endParaRPr lang="pt-BR"/>
@@ -3910,7 +3951,8 @@
           <a:p>
             <a:fld id="{236FA205-9359-4F40-A249-486FCDD57C7E}" type="datetimeFigureOut">
               <a:rPr lang="pt-BR" smtClean="0"/>
-              <a:t>11/12/2018</a:t>
+              <a:pPr/>
+              <a:t>12/12/2018</a:t>
             </a:fld>
             <a:endParaRPr lang="pt-BR"/>
           </a:p>
@@ -3956,6 +3998,7 @@
           <a:p>
             <a:fld id="{2765157F-0FE6-411A-8A48-E9EA9C39E43A}" type="slidenum">
               <a:rPr lang="pt-BR" smtClean="0"/>
+              <a:pPr/>
               <a:t>‹nº›</a:t>
             </a:fld>
             <a:endParaRPr lang="pt-BR"/>
@@ -4356,7 +4399,8 @@
           <a:p>
             <a:fld id="{236FA205-9359-4F40-A249-486FCDD57C7E}" type="datetimeFigureOut">
               <a:rPr lang="pt-BR" smtClean="0"/>
-              <a:t>11/12/2018</a:t>
+              <a:pPr/>
+              <a:t>12/12/2018</a:t>
             </a:fld>
             <a:endParaRPr lang="pt-BR"/>
           </a:p>
@@ -4402,6 +4446,7 @@
           <a:p>
             <a:fld id="{2765157F-0FE6-411A-8A48-E9EA9C39E43A}" type="slidenum">
               <a:rPr lang="pt-BR" smtClean="0"/>
+              <a:pPr/>
               <a:t>‹nº›</a:t>
             </a:fld>
             <a:endParaRPr lang="pt-BR"/>
@@ -4457,7 +4502,8 @@
           <a:p>
             <a:fld id="{236FA205-9359-4F40-A249-486FCDD57C7E}" type="datetimeFigureOut">
               <a:rPr lang="pt-BR" smtClean="0"/>
-              <a:t>11/12/2018</a:t>
+              <a:pPr/>
+              <a:t>12/12/2018</a:t>
             </a:fld>
             <a:endParaRPr lang="pt-BR"/>
           </a:p>
@@ -4503,6 +4549,7 @@
           <a:p>
             <a:fld id="{2765157F-0FE6-411A-8A48-E9EA9C39E43A}" type="slidenum">
               <a:rPr lang="pt-BR" smtClean="0"/>
+              <a:pPr/>
               <a:t>‹nº›</a:t>
             </a:fld>
             <a:endParaRPr lang="pt-BR"/>
@@ -4578,7 +4625,8 @@
           <a:p>
             <a:fld id="{236FA205-9359-4F40-A249-486FCDD57C7E}" type="datetimeFigureOut">
               <a:rPr lang="pt-BR" smtClean="0"/>
-              <a:t>11/12/2018</a:t>
+              <a:pPr/>
+              <a:t>12/12/2018</a:t>
             </a:fld>
             <a:endParaRPr lang="pt-BR"/>
           </a:p>
@@ -4624,6 +4672,7 @@
           <a:p>
             <a:fld id="{2765157F-0FE6-411A-8A48-E9EA9C39E43A}" type="slidenum">
               <a:rPr lang="pt-BR" smtClean="0"/>
+              <a:pPr/>
               <a:t>‹nº›</a:t>
             </a:fld>
             <a:endParaRPr lang="pt-BR"/>
@@ -4852,7 +4901,8 @@
           <a:p>
             <a:fld id="{236FA205-9359-4F40-A249-486FCDD57C7E}" type="datetimeFigureOut">
               <a:rPr lang="pt-BR" smtClean="0"/>
-              <a:t>11/12/2018</a:t>
+              <a:pPr/>
+              <a:t>12/12/2018</a:t>
             </a:fld>
             <a:endParaRPr lang="pt-BR"/>
           </a:p>
@@ -4898,6 +4948,7 @@
           <a:p>
             <a:fld id="{2765157F-0FE6-411A-8A48-E9EA9C39E43A}" type="slidenum">
               <a:rPr lang="pt-BR" smtClean="0"/>
+              <a:pPr/>
               <a:t>‹nº›</a:t>
             </a:fld>
             <a:endParaRPr lang="pt-BR"/>
@@ -5057,7 +5108,8 @@
           <a:p>
             <a:fld id="{236FA205-9359-4F40-A249-486FCDD57C7E}" type="datetimeFigureOut">
               <a:rPr lang="pt-BR" smtClean="0"/>
-              <a:t>11/12/2018</a:t>
+              <a:pPr/>
+              <a:t>12/12/2018</a:t>
             </a:fld>
             <a:endParaRPr lang="pt-BR"/>
           </a:p>
@@ -5122,6 +5174,7 @@
           <a:p>
             <a:fld id="{2765157F-0FE6-411A-8A48-E9EA9C39E43A}" type="slidenum">
               <a:rPr lang="pt-BR" smtClean="0"/>
+              <a:pPr/>
               <a:t>‹nº›</a:t>
             </a:fld>
             <a:endParaRPr lang="pt-BR"/>
@@ -6166,7 +6219,8 @@
           <a:p>
             <a:fld id="{236FA205-9359-4F40-A249-486FCDD57C7E}" type="datetimeFigureOut">
               <a:rPr lang="pt-BR" smtClean="0"/>
-              <a:t>11/12/2018</a:t>
+              <a:pPr/>
+              <a:t>12/12/2018</a:t>
             </a:fld>
             <a:endParaRPr lang="pt-BR"/>
           </a:p>
@@ -6242,6 +6296,7 @@
           <a:p>
             <a:fld id="{2765157F-0FE6-411A-8A48-E9EA9C39E43A}" type="slidenum">
               <a:rPr lang="pt-BR" smtClean="0"/>
+              <a:pPr/>
               <a:t>‹nº›</a:t>
             </a:fld>
             <a:endParaRPr lang="pt-BR"/>
@@ -6739,27 +6794,7 @@
             </a:pPr>
             <a:r>
               <a:rPr lang="pt-BR" sz="1600" dirty="0" smtClean="0"/>
-              <a:t>Memórias de longo-prazo estruturadas podem ser utilizadas para contornar </a:t>
-            </a:r>
-            <a:r>
-              <a:rPr lang="pt-BR" sz="1600" dirty="0" smtClean="0"/>
-              <a:t>as limitações </a:t>
-            </a:r>
-            <a:r>
-              <a:rPr lang="pt-BR" sz="1600" dirty="0" smtClean="0"/>
-              <a:t>em memórias de </a:t>
-            </a:r>
-            <a:r>
-              <a:rPr lang="pt-BR" sz="1600" dirty="0" smtClean="0"/>
-              <a:t>curto prazo, </a:t>
-            </a:r>
-            <a:r>
-              <a:rPr lang="pt-BR" sz="1600" dirty="0" smtClean="0"/>
-              <a:t>gerenciando o conhecimento em modelos </a:t>
-            </a:r>
-            <a:r>
-              <a:rPr lang="pt-BR" sz="1600" dirty="0" smtClean="0"/>
-              <a:t>mentais.</a:t>
+              <a:t>Memórias de longo-prazo estruturadas podem ser utilizadas para contornar as limitações em memórias de curto prazo, gerenciando o conhecimento em modelos mentais.</a:t>
             </a:r>
           </a:p>
           <a:p>
@@ -6770,15 +6805,7 @@
             </a:pPr>
             <a:r>
               <a:rPr lang="pt-BR" sz="1600" dirty="0" smtClean="0"/>
-              <a:t> Modelos Mentais são uma </a:t>
-            </a:r>
-            <a:r>
-              <a:rPr lang="pt-BR" sz="1600" dirty="0" smtClean="0"/>
-              <a:t>assimilação sistemática do funcionamento de </a:t>
-            </a:r>
-            <a:r>
-              <a:rPr lang="pt-BR" sz="1600" dirty="0" smtClean="0"/>
-              <a:t>algo (</a:t>
+              <a:t> Modelos Mentais são uma assimilação sistemática do funcionamento de algo (</a:t>
             </a:r>
             <a:r>
               <a:rPr lang="pt-BR" sz="1600" dirty="0" err="1" smtClean="0"/>
@@ -7182,6 +7209,133 @@
           </a:xfrm>
         </p:spPr>
       </p:pic>
+      <p:sp>
+        <p:nvSpPr>
+          <p:cNvPr id="6" name="Retângulo de cantos arredondados 5"/>
+          <p:cNvSpPr/>
+          <p:nvPr/>
+        </p:nvSpPr>
+        <p:spPr>
+          <a:xfrm>
+            <a:off x="5715008" y="642918"/>
+            <a:ext cx="2928958" cy="5786478"/>
+          </a:xfrm>
+          <a:prstGeom prst="roundRect">
+            <a:avLst/>
+          </a:prstGeom>
+          <a:solidFill>
+            <a:schemeClr val="bg1">
+              <a:lumMod val="75000"/>
+              <a:alpha val="67000"/>
+            </a:schemeClr>
+          </a:solidFill>
+          <a:ln>
+            <a:solidFill>
+              <a:schemeClr val="bg1">
+                <a:lumMod val="85000"/>
+              </a:schemeClr>
+            </a:solidFill>
+          </a:ln>
+        </p:spPr>
+        <p:style>
+          <a:lnRef idx="2">
+            <a:schemeClr val="accent1">
+              <a:shade val="50000"/>
+            </a:schemeClr>
+          </a:lnRef>
+          <a:fillRef idx="1">
+            <a:schemeClr val="accent1"/>
+          </a:fillRef>
+          <a:effectRef idx="0">
+            <a:schemeClr val="accent1"/>
+          </a:effectRef>
+          <a:fontRef idx="minor">
+            <a:schemeClr val="lt1"/>
+          </a:fontRef>
+        </p:style>
+        <p:txBody>
+          <a:bodyPr rtlCol="0" anchor="ctr"/>
+          <a:lstStyle/>
+          <a:p>
+            <a:pPr algn="just">
+              <a:lnSpc>
+                <a:spcPct val="150000"/>
+              </a:lnSpc>
+            </a:pPr>
+            <a:r>
+              <a:rPr lang="pt-BR" sz="1600" dirty="0" smtClean="0">
+                <a:solidFill>
+                  <a:schemeClr val="tx1"/>
+                </a:solidFill>
+              </a:rPr>
+              <a:t>Módulo Seletor: recebe parâmetros de execução do sistema, neste trabalho exemplificado por: </a:t>
+            </a:r>
+            <a:r>
+              <a:rPr lang="pt-BR" sz="1600" b="1" dirty="0" smtClean="0">
+                <a:solidFill>
+                  <a:schemeClr val="tx1"/>
+                </a:solidFill>
+              </a:rPr>
+              <a:t>Detecção do Estilo de Aprendizagem e Previsão do Desempenho Acadêmico do Estudante. </a:t>
+            </a:r>
+          </a:p>
+          <a:p>
+            <a:pPr algn="just">
+              <a:lnSpc>
+                <a:spcPct val="150000"/>
+              </a:lnSpc>
+            </a:pPr>
+            <a:r>
+              <a:rPr lang="pt-BR" sz="1600" dirty="0" smtClean="0">
+                <a:solidFill>
+                  <a:schemeClr val="tx1"/>
+                </a:solidFill>
+              </a:rPr>
+              <a:t>Define conjunto de </a:t>
+            </a:r>
+            <a:r>
+              <a:rPr lang="pt-BR" sz="1600" b="1" dirty="0" smtClean="0">
+                <a:solidFill>
+                  <a:schemeClr val="tx1"/>
+                </a:solidFill>
+              </a:rPr>
+              <a:t>regras decisórias</a:t>
+            </a:r>
+            <a:r>
+              <a:rPr lang="pt-BR" sz="1600" dirty="0" smtClean="0">
+                <a:solidFill>
+                  <a:schemeClr val="tx1"/>
+                </a:solidFill>
+              </a:rPr>
+              <a:t> e técnicas de </a:t>
+            </a:r>
+            <a:r>
+              <a:rPr lang="pt-BR" sz="1600" b="1" dirty="0" smtClean="0">
+                <a:solidFill>
+                  <a:schemeClr val="tx1"/>
+                </a:solidFill>
+              </a:rPr>
+              <a:t>Mineração de Dados Educacionais</a:t>
+            </a:r>
+            <a:r>
+              <a:rPr lang="pt-BR" sz="1600" dirty="0" smtClean="0">
+                <a:solidFill>
+                  <a:schemeClr val="tx1"/>
+                </a:solidFill>
+              </a:rPr>
+              <a:t> que devem ser utilizadas.</a:t>
+            </a:r>
+          </a:p>
+          <a:p>
+            <a:pPr algn="ctr"/>
+            <a:endParaRPr lang="pt-BR" sz="1600" b="1" dirty="0">
+              <a:solidFill>
+                <a:schemeClr val="tx1"/>
+              </a:solidFill>
+            </a:endParaRPr>
+          </a:p>
+        </p:txBody>
+      </p:sp>
     </p:spTree>
   </p:cSld>
   <p:clrMapOvr>
@@ -7190,9 +7344,234 @@
   <p:timing>
     <p:tnLst>
       <p:par>
-        <p:cTn id="1" dur="indefinite" restart="never" nodeType="tmRoot"/>
+        <p:cTn id="1" dur="indefinite" restart="never" nodeType="tmRoot">
+          <p:childTnLst>
+            <p:seq concurrent="1" nextAc="seek">
+              <p:cTn id="2" dur="indefinite" nodeType="mainSeq">
+                <p:childTnLst>
+                  <p:par>
+                    <p:cTn id="3" fill="hold">
+                      <p:stCondLst>
+                        <p:cond delay="indefinite"/>
+                      </p:stCondLst>
+                      <p:childTnLst>
+                        <p:par>
+                          <p:cTn id="4" fill="hold">
+                            <p:stCondLst>
+                              <p:cond delay="0"/>
+                            </p:stCondLst>
+                            <p:childTnLst>
+                              <p:par>
+                                <p:cTn id="5" presetID="2" presetClass="entr" presetSubtype="4" fill="hold" grpId="0" nodeType="clickEffect">
+                                  <p:stCondLst>
+                                    <p:cond delay="0"/>
+                                  </p:stCondLst>
+                                  <p:childTnLst>
+                                    <p:set>
+                                      <p:cBhvr>
+                                        <p:cTn id="6" dur="1" fill="hold">
+                                          <p:stCondLst>
+                                            <p:cond delay="0"/>
+                                          </p:stCondLst>
+                                        </p:cTn>
+                                        <p:tgtEl>
+                                          <p:spTgt spid="6"/>
+                                        </p:tgtEl>
+                                        <p:attrNameLst>
+                                          <p:attrName>style.visibility</p:attrName>
+                                        </p:attrNameLst>
+                                      </p:cBhvr>
+                                      <p:to>
+                                        <p:strVal val="visible"/>
+                                      </p:to>
+                                    </p:set>
+                                    <p:anim calcmode="lin" valueType="num">
+                                      <p:cBhvr additive="base">
+                                        <p:cTn id="7" dur="500" fill="hold"/>
+                                        <p:tgtEl>
+                                          <p:spTgt spid="6"/>
+                                        </p:tgtEl>
+                                        <p:attrNameLst>
+                                          <p:attrName>ppt_x</p:attrName>
+                                        </p:attrNameLst>
+                                      </p:cBhvr>
+                                      <p:tavLst>
+                                        <p:tav tm="0">
+                                          <p:val>
+                                            <p:strVal val="#ppt_x"/>
+                                          </p:val>
+                                        </p:tav>
+                                        <p:tav tm="100000">
+                                          <p:val>
+                                            <p:strVal val="#ppt_x"/>
+                                          </p:val>
+                                        </p:tav>
+                                      </p:tavLst>
+                                    </p:anim>
+                                    <p:anim calcmode="lin" valueType="num">
+                                      <p:cBhvr additive="base">
+                                        <p:cTn id="8" dur="500" fill="hold"/>
+                                        <p:tgtEl>
+                                          <p:spTgt spid="6"/>
+                                        </p:tgtEl>
+                                        <p:attrNameLst>
+                                          <p:attrName>ppt_y</p:attrName>
+                                        </p:attrNameLst>
+                                      </p:cBhvr>
+                                      <p:tavLst>
+                                        <p:tav tm="0">
+                                          <p:val>
+                                            <p:strVal val="1+#ppt_h/2"/>
+                                          </p:val>
+                                        </p:tav>
+                                        <p:tav tm="100000">
+                                          <p:val>
+                                            <p:strVal val="#ppt_y"/>
+                                          </p:val>
+                                        </p:tav>
+                                      </p:tavLst>
+                                    </p:anim>
+                                  </p:childTnLst>
+                                </p:cTn>
+                              </p:par>
+                            </p:childTnLst>
+                          </p:cTn>
+                        </p:par>
+                      </p:childTnLst>
+                    </p:cTn>
+                  </p:par>
+                  <p:par>
+                    <p:cTn id="9" fill="hold">
+                      <p:stCondLst>
+                        <p:cond delay="indefinite"/>
+                      </p:stCondLst>
+                      <p:childTnLst>
+                        <p:par>
+                          <p:cTn id="10" fill="hold">
+                            <p:stCondLst>
+                              <p:cond delay="0"/>
+                            </p:stCondLst>
+                            <p:childTnLst>
+                              <p:par>
+                                <p:cTn id="11" presetID="9" presetClass="entr" presetSubtype="0" fill="hold" grpId="1" nodeType="clickEffect">
+                                  <p:stCondLst>
+                                    <p:cond delay="0"/>
+                                  </p:stCondLst>
+                                  <p:childTnLst>
+                                    <p:set>
+                                      <p:cBhvr>
+                                        <p:cTn id="12" dur="1" fill="hold">
+                                          <p:stCondLst>
+                                            <p:cond delay="0"/>
+                                          </p:stCondLst>
+                                        </p:cTn>
+                                        <p:tgtEl>
+                                          <p:spTgt spid="6"/>
+                                        </p:tgtEl>
+                                        <p:attrNameLst>
+                                          <p:attrName>style.visibility</p:attrName>
+                                        </p:attrNameLst>
+                                      </p:cBhvr>
+                                      <p:to>
+                                        <p:strVal val="visible"/>
+                                      </p:to>
+                                    </p:set>
+                                    <p:animEffect transition="in" filter="dissolve">
+                                      <p:cBhvr>
+                                        <p:cTn id="13" dur="500"/>
+                                        <p:tgtEl>
+                                          <p:spTgt spid="6"/>
+                                        </p:tgtEl>
+                                      </p:cBhvr>
+                                    </p:animEffect>
+                                  </p:childTnLst>
+                                </p:cTn>
+                              </p:par>
+                            </p:childTnLst>
+                          </p:cTn>
+                        </p:par>
+                      </p:childTnLst>
+                    </p:cTn>
+                  </p:par>
+                  <p:par>
+                    <p:cTn id="14" fill="hold">
+                      <p:stCondLst>
+                        <p:cond delay="indefinite"/>
+                      </p:stCondLst>
+                      <p:childTnLst>
+                        <p:par>
+                          <p:cTn id="15" fill="hold">
+                            <p:stCondLst>
+                              <p:cond delay="0"/>
+                            </p:stCondLst>
+                            <p:childTnLst>
+                              <p:par>
+                                <p:cTn id="16" presetID="22" presetClass="entr" presetSubtype="4" fill="hold" grpId="2" nodeType="clickEffect">
+                                  <p:stCondLst>
+                                    <p:cond delay="0"/>
+                                  </p:stCondLst>
+                                  <p:childTnLst>
+                                    <p:set>
+                                      <p:cBhvr>
+                                        <p:cTn id="17" dur="1" fill="hold">
+                                          <p:stCondLst>
+                                            <p:cond delay="0"/>
+                                          </p:stCondLst>
+                                        </p:cTn>
+                                        <p:tgtEl>
+                                          <p:spTgt spid="6"/>
+                                        </p:tgtEl>
+                                        <p:attrNameLst>
+                                          <p:attrName>style.visibility</p:attrName>
+                                        </p:attrNameLst>
+                                      </p:cBhvr>
+                                      <p:to>
+                                        <p:strVal val="visible"/>
+                                      </p:to>
+                                    </p:set>
+                                    <p:animEffect transition="in" filter="wipe(down)">
+                                      <p:cBhvr>
+                                        <p:cTn id="18" dur="500"/>
+                                        <p:tgtEl>
+                                          <p:spTgt spid="6"/>
+                                        </p:tgtEl>
+                                      </p:cBhvr>
+                                    </p:animEffect>
+                                  </p:childTnLst>
+                                </p:cTn>
+                              </p:par>
+                            </p:childTnLst>
+                          </p:cTn>
+                        </p:par>
+                      </p:childTnLst>
+                    </p:cTn>
+                  </p:par>
+                </p:childTnLst>
+              </p:cTn>
+              <p:prevCondLst>
+                <p:cond evt="onPrev" delay="0">
+                  <p:tgtEl>
+                    <p:sldTgt/>
+                  </p:tgtEl>
+                </p:cond>
+              </p:prevCondLst>
+              <p:nextCondLst>
+                <p:cond evt="onNext" delay="0">
+                  <p:tgtEl>
+                    <p:sldTgt/>
+                  </p:tgtEl>
+                </p:cond>
+              </p:nextCondLst>
+            </p:seq>
+          </p:childTnLst>
+        </p:cTn>
       </p:par>
     </p:tnLst>
+    <p:bldLst>
+      <p:bldP spid="6" grpId="0" animBg="1"/>
+      <p:bldP spid="6" grpId="1" animBg="1"/>
+      <p:bldP spid="6" grpId="2" animBg="1"/>
+    </p:bldLst>
   </p:timing>
 </p:sld>
 </file>
@@ -7238,29 +7617,12 @@
             </a:pPr>
             <a:r>
               <a:rPr lang="pt-BR" sz="1600" dirty="0" smtClean="0"/>
-              <a:t>Módulo Seletor: recebe parâmetros de execução do sistema, neste </a:t>
-            </a:r>
-            <a:r>
-              <a:rPr lang="pt-BR" sz="1600" dirty="0" smtClean="0"/>
-              <a:t>trabalho </a:t>
-            </a:r>
-            <a:r>
-              <a:rPr lang="pt-BR" sz="1600" dirty="0" smtClean="0"/>
-              <a:t>exemplificado por: </a:t>
+              <a:t>Módulo Seletor: recebe parâmetros de execução do sistema, neste trabalho exemplificado por: </a:t>
             </a:r>
             <a:r>
               <a:rPr lang="pt-BR" sz="1600" b="1" dirty="0" smtClean="0"/>
-              <a:t>Detecção do Estilo </a:t>
-            </a:r>
-            <a:r>
-              <a:rPr lang="pt-BR" sz="1600" b="1" dirty="0" smtClean="0"/>
-              <a:t>de Aprendizagem e Previsão </a:t>
-            </a:r>
-            <a:r>
-              <a:rPr lang="pt-BR" sz="1600" b="1" dirty="0" smtClean="0"/>
-              <a:t>do Desempenho Acadêmico do Estudante. </a:t>
-            </a:r>
-            <a:endParaRPr lang="pt-BR" sz="1600" b="1" dirty="0" smtClean="0"/>
+              <a:t>Detecção do Estilo de Aprendizagem e Previsão do Desempenho Acadêmico do Estudante. </a:t>
+            </a:r>
           </a:p>
           <a:p>
             <a:pPr algn="just">
@@ -7390,8 +7752,8 @@
         </p:blipFill>
         <p:spPr>
           <a:xfrm rot="5400000">
-            <a:off x="2249472" y="-463577"/>
-            <a:ext cx="4509689" cy="8151440"/>
+            <a:off x="2364850" y="-864706"/>
+            <a:ext cx="4795441" cy="8667948"/>
           </a:xfrm>
         </p:spPr>
       </p:pic>
@@ -7786,15 +8148,7 @@
             </a:pPr>
             <a:r>
               <a:rPr lang="pt-BR" sz="1600" dirty="0" smtClean="0"/>
-              <a:t>Expande </a:t>
-            </a:r>
-            <a:r>
-              <a:rPr lang="pt-BR" sz="1600" dirty="0" smtClean="0"/>
-              <a:t>o uso das técnicas de MDE</a:t>
-            </a:r>
-            <a:r>
-              <a:rPr lang="pt-BR" sz="1600" dirty="0" smtClean="0"/>
-              <a:t>.</a:t>
+              <a:t>Expande o uso das técnicas de MDE.</a:t>
             </a:r>
           </a:p>
           <a:p>
@@ -7904,23 +8258,7 @@
             </a:pPr>
             <a:r>
               <a:rPr lang="pt-BR" sz="1600" dirty="0" smtClean="0"/>
-              <a:t>A </a:t>
-            </a:r>
-            <a:r>
-              <a:rPr lang="pt-BR" sz="1600" dirty="0" smtClean="0"/>
-              <a:t>escassez de trabalhos e </a:t>
-            </a:r>
-            <a:r>
-              <a:rPr lang="pt-BR" sz="1600" dirty="0" smtClean="0"/>
-              <a:t>modelos </a:t>
-            </a:r>
-            <a:r>
-              <a:rPr lang="pt-BR" sz="1600" dirty="0" smtClean="0"/>
-              <a:t>de CS aplicados na área </a:t>
-            </a:r>
-            <a:r>
-              <a:rPr lang="pt-BR" sz="1600" dirty="0" smtClean="0"/>
-              <a:t>educacional.</a:t>
+              <a:t>A escassez de trabalhos e modelos de CS aplicados na área educacional.</a:t>
             </a:r>
           </a:p>
         </p:txBody>
@@ -8315,11 +8653,7 @@
             </a:pPr>
             <a:r>
               <a:rPr lang="en-US" sz="1600" dirty="0" smtClean="0"/>
-              <a:t>ENDSLEY, M. R. PROCEEDINGS OF THE HUMAN FACTORS </a:t>
-            </a:r>
-            <a:r>
-              <a:rPr lang="en-US" sz="1600" dirty="0" smtClean="0"/>
-              <a:t>SOCIETY-32</a:t>
+              <a:t>ENDSLEY, M. R. PROCEEDINGS OF THE HUMAN FACTORS SOCIETY-32</a:t>
             </a:r>
             <a:r>
               <a:rPr lang="en-US" sz="1600" baseline="30000" dirty="0" smtClean="0"/>
@@ -8327,11 +8661,7 @@
             </a:r>
             <a:r>
               <a:rPr lang="en-US" sz="1600" dirty="0" smtClean="0"/>
-              <a:t> ANNUAL </a:t>
-            </a:r>
-            <a:r>
-              <a:rPr lang="en-US" sz="1600" dirty="0" smtClean="0"/>
-              <a:t>MEETING1988. In: Proc. Hum. FACTORS Soc. Hawthorne, CA: [</a:t>
+              <a:t> ANNUAL MEETING1988. In: Proc. Hum. FACTORS Soc. Hawthorne, CA: [</a:t>
             </a:r>
             <a:r>
               <a:rPr lang="en-US" sz="1600" dirty="0" err="1" smtClean="0"/>
@@ -8339,15 +8669,7 @@
             </a:r>
             <a:r>
               <a:rPr lang="en-US" sz="1600" dirty="0" smtClean="0"/>
-              <a:t>.], 1988</a:t>
-            </a:r>
-            <a:r>
-              <a:rPr lang="en-US" sz="1600" dirty="0" smtClean="0"/>
-              <a:t>. p. 97–101</a:t>
-            </a:r>
-            <a:r>
-              <a:rPr lang="en-US" sz="1600" dirty="0" smtClean="0"/>
-              <a:t>.</a:t>
+              <a:t>.], 1988. p. 97–101.</a:t>
             </a:r>
           </a:p>
           <a:p>
@@ -8358,15 +8680,7 @@
             </a:pPr>
             <a:r>
               <a:rPr lang="en-US" sz="1600" dirty="0" smtClean="0"/>
-              <a:t>ENDSLEY, M. R. Toward a Theory of Situation Awareness in Dynamic Systems. </a:t>
-            </a:r>
-            <a:r>
-              <a:rPr lang="en-US" sz="1600" dirty="0" smtClean="0"/>
-              <a:t>Hum. Factors </a:t>
-            </a:r>
-            <a:r>
-              <a:rPr lang="en-US" sz="1600" dirty="0" smtClean="0"/>
-              <a:t>J. Hum. Factors </a:t>
+              <a:t>ENDSLEY, M. R. Toward a Theory of Situation Awareness in Dynamic Systems. Hum. Factors J. Hum. Factors </a:t>
             </a:r>
             <a:r>
               <a:rPr lang="en-US" sz="1600" dirty="0" err="1" smtClean="0"/>
@@ -8374,11 +8688,7 @@
             </a:r>
             <a:r>
               <a:rPr lang="en-US" sz="1600" dirty="0" smtClean="0"/>
-              <a:t>. Soc., v. 37, n. 1, p. 32–64, 1995. ISSN </a:t>
-            </a:r>
-            <a:r>
-              <a:rPr lang="en-US" sz="1600" dirty="0" smtClean="0"/>
-              <a:t>0018-7208.</a:t>
+              <a:t>. Soc., v. 37, n. 1, p. 32–64, 1995. ISSN 0018-7208.</a:t>
             </a:r>
           </a:p>
           <a:p>
@@ -8389,27 +8699,7 @@
             </a:pPr>
             <a:r>
               <a:rPr lang="en-US" sz="1600" dirty="0" smtClean="0"/>
-              <a:t>ROMERO, C.; VENTURA, S.; BRA, P. Knowledge discovery with genetic </a:t>
-            </a:r>
-            <a:r>
-              <a:rPr lang="en-US" sz="1600" dirty="0" smtClean="0"/>
-              <a:t>programming for </a:t>
-            </a:r>
-            <a:r>
-              <a:rPr lang="en-US" sz="1600" dirty="0" smtClean="0"/>
-              <a:t>providing feedback to courseware author. User Model. User-Adapted Interact. </a:t>
-            </a:r>
-            <a:r>
-              <a:rPr lang="en-US" sz="1600" dirty="0" smtClean="0"/>
-              <a:t>J. Pers</a:t>
-            </a:r>
-            <a:r>
-              <a:rPr lang="en-US" sz="1600" dirty="0" smtClean="0"/>
-              <a:t>. Res. 14(5), p. 425–464, </a:t>
-            </a:r>
-            <a:r>
-              <a:rPr lang="en-US" sz="1600" dirty="0" smtClean="0"/>
-              <a:t>2004.</a:t>
+              <a:t>ROMERO, C.; VENTURA, S.; BRA, P. Knowledge discovery with genetic programming for providing feedback to courseware author. User Model. User-Adapted Interact. J. Pers. Res. 14(5), p. 425–464, 2004.</a:t>
             </a:r>
           </a:p>
           <a:p>
@@ -8455,35 +8745,7 @@
             </a:pPr>
             <a:r>
               <a:rPr lang="pt-BR" sz="1600" dirty="0" smtClean="0"/>
-              <a:t>BERTI, C. B. MODELO PREDITIVO DE SITUAÇÕES COMO APOIO </a:t>
-            </a:r>
-            <a:r>
-              <a:rPr lang="pt-BR" sz="1600" dirty="0" smtClean="0"/>
-              <a:t>À CONSCIÊNCIA </a:t>
-            </a:r>
-            <a:r>
-              <a:rPr lang="pt-BR" sz="1600" dirty="0" smtClean="0"/>
-              <a:t>SITUACIONAL E AO PROCESSO DECISÓRIO EM </a:t>
-            </a:r>
-            <a:r>
-              <a:rPr lang="pt-BR" sz="1600" dirty="0" smtClean="0"/>
-              <a:t>SISTEMAS DE </a:t>
-            </a:r>
-            <a:r>
-              <a:rPr lang="pt-BR" sz="1600" dirty="0" smtClean="0"/>
-              <a:t>RESPOSTA À EMERGÊNCIA. 150 p. Tese (Doutorado) — </a:t>
-            </a:r>
-            <a:r>
-              <a:rPr lang="pt-BR" sz="1600" dirty="0" smtClean="0"/>
-              <a:t>UNIVERSIDADE FEDERAL </a:t>
-            </a:r>
-            <a:r>
-              <a:rPr lang="pt-BR" sz="1600" dirty="0" smtClean="0"/>
-              <a:t>DE SÃO CARLOS, 2017</a:t>
-            </a:r>
-            <a:r>
-              <a:rPr lang="pt-BR" sz="1600" dirty="0" smtClean="0"/>
-              <a:t>.</a:t>
+              <a:t>BERTI, C. B. MODELO PREDITIVO DE SITUAÇÕES COMO APOIO À CONSCIÊNCIA SITUACIONAL E AO PROCESSO DECISÓRIO EM SISTEMAS DE RESPOSTA À EMERGÊNCIA. 150 p. Tese (Doutorado) — UNIVERSIDADE FEDERAL DE SÃO CARLOS, 2017.</a:t>
             </a:r>
           </a:p>
         </p:txBody>
@@ -8600,13 +8862,8 @@
             </a:pPr>
             <a:r>
               <a:rPr lang="pt-BR" sz="1600" dirty="0" smtClean="0"/>
-              <a:t>Alunos e professores interagem com estes softwares através de discussão em fóruns, chats, atividades e ações propostas. </a:t>
-            </a:r>
-            <a:r>
-              <a:rPr lang="pt-BR" sz="1600" dirty="0" smtClean="0"/>
-              <a:t>	</a:t>
-            </a:r>
-            <a:endParaRPr lang="pt-BR" sz="1600" dirty="0" smtClean="0"/>
+              <a:t>Alunos e professores interagem com estes softwares através de discussão em fóruns, chats, atividades e ações propostas. 	</a:t>
+            </a:r>
           </a:p>
           <a:p>
             <a:pPr algn="just">
@@ -8620,23 +8877,7 @@
             </a:r>
             <a:r>
               <a:rPr lang="pt-BR" sz="1600" dirty="0" smtClean="0"/>
-              <a:t> viabilizam modalidades </a:t>
-            </a:r>
-            <a:r>
-              <a:rPr lang="pt-BR" sz="1600" dirty="0" smtClean="0"/>
-              <a:t>de ensino </a:t>
-            </a:r>
-            <a:r>
-              <a:rPr lang="pt-BR" sz="1600" dirty="0" smtClean="0"/>
-              <a:t>da Educação a Distância, utilizando-se das mais </a:t>
-            </a:r>
-            <a:r>
-              <a:rPr lang="pt-BR" sz="1600" dirty="0" smtClean="0"/>
-              <a:t>diversas tecnologias da informação em vários graus educacionais</a:t>
-            </a:r>
-            <a:r>
-              <a:rPr lang="pt-BR" sz="1600" dirty="0" smtClean="0"/>
-              <a:t>.</a:t>
+              <a:t> viabilizam modalidades de ensino da Educação a Distância, utilizando-se das mais diversas tecnologias da informação em vários graus educacionais.</a:t>
             </a:r>
           </a:p>
         </p:txBody>
@@ -8733,15 +8974,7 @@
             </a:pPr>
             <a:r>
               <a:rPr lang="pt-BR" sz="1600" dirty="0" smtClean="0"/>
-              <a:t>A utilização </a:t>
-            </a:r>
-            <a:r>
-              <a:rPr lang="pt-BR" sz="1600" dirty="0" smtClean="0"/>
-              <a:t>das plataformas pelos </a:t>
-            </a:r>
-            <a:r>
-              <a:rPr lang="pt-BR" sz="1600" dirty="0" smtClean="0"/>
-              <a:t>usuários gera quantidade considerável de dados.</a:t>
+              <a:t>A utilização das plataformas pelos usuários gera quantidade considerável de dados.</a:t>
             </a:r>
           </a:p>
           <a:p>
@@ -8857,11 +9090,7 @@
             </a:pPr>
             <a:r>
               <a:rPr lang="pt-BR" sz="1600" dirty="0" smtClean="0"/>
-              <a:t>O </a:t>
-            </a:r>
-            <a:r>
-              <a:rPr lang="pt-BR" sz="1600" dirty="0" smtClean="0"/>
-              <a:t>uso de modelos computacionais baseados em CS aplicados a </a:t>
+              <a:t>O uso de modelos computacionais baseados em CS aplicados a </a:t>
             </a:r>
             <a:r>
               <a:rPr lang="pt-BR" sz="1600" dirty="0" err="1" smtClean="0"/>
@@ -8869,19 +9098,7 @@
             </a:r>
             <a:r>
               <a:rPr lang="pt-BR" sz="1600" dirty="0" smtClean="0"/>
-              <a:t> não é </a:t>
-            </a:r>
-            <a:r>
-              <a:rPr lang="pt-BR" sz="1600" dirty="0" smtClean="0"/>
-              <a:t>recorrente </a:t>
-            </a:r>
-            <a:r>
-              <a:rPr lang="pt-BR" sz="1600" dirty="0" smtClean="0"/>
-              <a:t>na </a:t>
-            </a:r>
-            <a:r>
-              <a:rPr lang="pt-BR" sz="1600" dirty="0" smtClean="0"/>
-              <a:t>área.</a:t>
+              <a:t> não é recorrente na área.</a:t>
             </a:r>
           </a:p>
           <a:p>
@@ -8892,23 +9109,7 @@
             </a:pPr>
             <a:r>
               <a:rPr lang="pt-BR" sz="1600" dirty="0" smtClean="0"/>
-              <a:t>Construção </a:t>
-            </a:r>
-            <a:r>
-              <a:rPr lang="pt-BR" sz="1600" dirty="0" smtClean="0"/>
-              <a:t>de um </a:t>
-            </a:r>
-            <a:r>
-              <a:rPr lang="pt-BR" sz="1600" dirty="0" smtClean="0"/>
-              <a:t>modelo de </a:t>
-            </a:r>
-            <a:r>
-              <a:rPr lang="pt-BR" sz="1600" dirty="0" smtClean="0"/>
-              <a:t>ensino adaptativo baseado em </a:t>
-            </a:r>
-            <a:r>
-              <a:rPr lang="pt-BR" sz="1600" dirty="0" smtClean="0"/>
-              <a:t>Consciência Situacional.</a:t>
+              <a:t>Construção de um modelo de ensino adaptativo baseado em Consciência Situacional.</a:t>
             </a:r>
           </a:p>
           <a:p>
@@ -9002,29 +9203,8 @@
             </a:pPr>
             <a:r>
               <a:rPr lang="pt-BR" sz="1600" dirty="0" smtClean="0"/>
-              <a:t>“... a </a:t>
-            </a:r>
-            <a:r>
-              <a:rPr lang="pt-BR" sz="1600" dirty="0" smtClean="0"/>
-              <a:t>percepção dos elementos no ambiente dentro de um </a:t>
-            </a:r>
-            <a:r>
-              <a:rPr lang="pt-BR" sz="1600" dirty="0" smtClean="0"/>
-              <a:t>volume </a:t>
-            </a:r>
-            <a:r>
-              <a:rPr lang="pt-BR" sz="1600" dirty="0" smtClean="0"/>
-              <a:t>de tempo e espaço, a compreensão dos seus significados, e a projeção dos </a:t>
-            </a:r>
-            <a:r>
-              <a:rPr lang="pt-BR" sz="1600" dirty="0" smtClean="0"/>
-              <a:t>seus estados </a:t>
-            </a:r>
-            <a:r>
-              <a:rPr lang="pt-BR" sz="1600" dirty="0" smtClean="0"/>
-              <a:t>em um futuro próximo ”(ENDSLEY, 1988).</a:t>
-            </a:r>
-            <a:endParaRPr lang="pt-BR" sz="1600" dirty="0" smtClean="0"/>
+              <a:t>“... a percepção dos elementos no ambiente dentro de um volume de tempo e espaço, a compreensão dos seus significados, e a projeção dos seus estados em um futuro próximo ”(ENDSLEY, 1988).</a:t>
+            </a:r>
           </a:p>
         </p:txBody>
       </p:sp>
@@ -9334,23 +9514,11 @@
             </a:r>
             <a:r>
               <a:rPr lang="pt-BR" sz="1600" dirty="0" smtClean="0"/>
-              <a:t> e Jones (2012) o </a:t>
-            </a:r>
-            <a:r>
-              <a:rPr lang="pt-BR" sz="1600" dirty="0" smtClean="0"/>
-              <a:t>indivíduo </a:t>
-            </a:r>
-            <a:r>
-              <a:rPr lang="pt-BR" sz="1600" dirty="0" smtClean="0"/>
-              <a:t>possui dois tipos de memórias: </a:t>
+              <a:t> e Jones (2012) o indivíduo possui dois tipos de memórias: </a:t>
             </a:r>
             <a:r>
               <a:rPr lang="pt-BR" sz="1600" i="1" dirty="0" smtClean="0"/>
-              <a:t>de </a:t>
-            </a:r>
-            <a:r>
-              <a:rPr lang="pt-BR" sz="1600" i="1" dirty="0" smtClean="0"/>
-              <a:t>curto prazo </a:t>
+              <a:t>de curto prazo </a:t>
             </a:r>
             <a:r>
               <a:rPr lang="pt-BR" sz="1600" dirty="0" smtClean="0"/>

</xml_diff>